<commit_message>
Loudoun County Growth Study
</commit_message>
<xml_diff>
--- a/presentation/Loudoun County Growth Study.pptx
+++ b/presentation/Loudoun County Growth Study.pptx
@@ -148,7 +148,7 @@
   <pc:docChgLst>
     <pc:chgData name="Andrew Kemp" userId="06d23b41cf651141" providerId="LiveId" clId="{64F8F7E6-B0A7-4A67-BE43-D2AC88E1A641}"/>
     <pc:docChg chg="undo custSel addSld delSld modSld sldOrd">
-      <pc:chgData name="Andrew Kemp" userId="06d23b41cf651141" providerId="LiveId" clId="{64F8F7E6-B0A7-4A67-BE43-D2AC88E1A641}" dt="2024-12-02T18:34:23.293" v="825" actId="20577"/>
+      <pc:chgData name="Andrew Kemp" userId="06d23b41cf651141" providerId="LiveId" clId="{64F8F7E6-B0A7-4A67-BE43-D2AC88E1A641}" dt="2024-12-03T17:11:25.537" v="921" actId="26606"/>
       <pc:docMkLst>
         <pc:docMk/>
       </pc:docMkLst>
@@ -577,7 +577,7 @@
         </pc:picChg>
       </pc:sldChg>
       <pc:sldChg chg="addSp modSp new mod">
-        <pc:chgData name="Andrew Kemp" userId="06d23b41cf651141" providerId="LiveId" clId="{64F8F7E6-B0A7-4A67-BE43-D2AC88E1A641}" dt="2024-12-02T18:34:00.935" v="811" actId="20577"/>
+        <pc:chgData name="Andrew Kemp" userId="06d23b41cf651141" providerId="LiveId" clId="{64F8F7E6-B0A7-4A67-BE43-D2AC88E1A641}" dt="2024-12-03T17:05:05.147" v="906" actId="20577"/>
         <pc:sldMkLst>
           <pc:docMk/>
           <pc:sldMk cId="239434237" sldId="266"/>
@@ -591,7 +591,7 @@
           </ac:spMkLst>
         </pc:spChg>
         <pc:spChg chg="mod">
-          <ac:chgData name="Andrew Kemp" userId="06d23b41cf651141" providerId="LiveId" clId="{64F8F7E6-B0A7-4A67-BE43-D2AC88E1A641}" dt="2024-12-02T17:16:12.365" v="723" actId="113"/>
+          <ac:chgData name="Andrew Kemp" userId="06d23b41cf651141" providerId="LiveId" clId="{64F8F7E6-B0A7-4A67-BE43-D2AC88E1A641}" dt="2024-12-03T17:05:05.147" v="906" actId="20577"/>
           <ac:spMkLst>
             <pc:docMk/>
             <pc:sldMk cId="239434237" sldId="266"/>
@@ -977,13 +977,13 @@
         </pc:picChg>
       </pc:sldChg>
       <pc:sldChg chg="addSp delSp modSp new mod">
-        <pc:chgData name="Andrew Kemp" userId="06d23b41cf651141" providerId="LiveId" clId="{64F8F7E6-B0A7-4A67-BE43-D2AC88E1A641}" dt="2024-12-02T17:23:28.059" v="752" actId="113"/>
+        <pc:chgData name="Andrew Kemp" userId="06d23b41cf651141" providerId="LiveId" clId="{64F8F7E6-B0A7-4A67-BE43-D2AC88E1A641}" dt="2024-12-03T17:09:38.460" v="912" actId="1076"/>
         <pc:sldMkLst>
           <pc:docMk/>
           <pc:sldMk cId="914447653" sldId="273"/>
         </pc:sldMkLst>
         <pc:spChg chg="mod">
-          <ac:chgData name="Andrew Kemp" userId="06d23b41cf651141" providerId="LiveId" clId="{64F8F7E6-B0A7-4A67-BE43-D2AC88E1A641}" dt="2024-12-02T15:54:22.474" v="390" actId="113"/>
+          <ac:chgData name="Andrew Kemp" userId="06d23b41cf651141" providerId="LiveId" clId="{64F8F7E6-B0A7-4A67-BE43-D2AC88E1A641}" dt="2024-12-03T17:04:14.972" v="863" actId="20577"/>
           <ac:spMkLst>
             <pc:docMk/>
             <pc:sldMk cId="914447653" sldId="273"/>
@@ -991,7 +991,7 @@
           </ac:spMkLst>
         </pc:spChg>
         <pc:spChg chg="add del mod">
-          <ac:chgData name="Andrew Kemp" userId="06d23b41cf651141" providerId="LiveId" clId="{64F8F7E6-B0A7-4A67-BE43-D2AC88E1A641}" dt="2024-12-02T17:23:28.059" v="752" actId="113"/>
+          <ac:chgData name="Andrew Kemp" userId="06d23b41cf651141" providerId="LiveId" clId="{64F8F7E6-B0A7-4A67-BE43-D2AC88E1A641}" dt="2024-12-03T17:04:36.364" v="895" actId="20577"/>
           <ac:spMkLst>
             <pc:docMk/>
             <pc:sldMk cId="914447653" sldId="273"/>
@@ -1007,7 +1007,15 @@
           </ac:spMkLst>
         </pc:spChg>
         <pc:picChg chg="add mod">
-          <ac:chgData name="Andrew Kemp" userId="06d23b41cf651141" providerId="LiveId" clId="{64F8F7E6-B0A7-4A67-BE43-D2AC88E1A641}" dt="2024-12-02T15:54:06.181" v="387" actId="1076"/>
+          <ac:chgData name="Andrew Kemp" userId="06d23b41cf651141" providerId="LiveId" clId="{64F8F7E6-B0A7-4A67-BE43-D2AC88E1A641}" dt="2024-12-03T17:09:38.460" v="912" actId="1076"/>
+          <ac:picMkLst>
+            <pc:docMk/>
+            <pc:sldMk cId="914447653" sldId="273"/>
+            <ac:picMk id="5" creationId="{41D28ECC-03FF-7BBA-7567-1F114A032208}"/>
+          </ac:picMkLst>
+        </pc:picChg>
+        <pc:picChg chg="add del mod">
+          <ac:chgData name="Andrew Kemp" userId="06d23b41cf651141" providerId="LiveId" clId="{64F8F7E6-B0A7-4A67-BE43-D2AC88E1A641}" dt="2024-12-03T17:09:21.101" v="907" actId="478"/>
           <ac:picMkLst>
             <pc:docMk/>
             <pc:sldMk cId="914447653" sldId="273"/>
@@ -1061,14 +1069,14 @@
           </ac:spMkLst>
         </pc:spChg>
       </pc:sldChg>
-      <pc:sldChg chg="addSp delSp modSp new mod">
-        <pc:chgData name="Andrew Kemp" userId="06d23b41cf651141" providerId="LiveId" clId="{64F8F7E6-B0A7-4A67-BE43-D2AC88E1A641}" dt="2024-12-02T16:14:13.789" v="492" actId="20577"/>
+      <pc:sldChg chg="addSp delSp modSp new mod setBg">
+        <pc:chgData name="Andrew Kemp" userId="06d23b41cf651141" providerId="LiveId" clId="{64F8F7E6-B0A7-4A67-BE43-D2AC88E1A641}" dt="2024-12-03T17:11:25.537" v="921" actId="26606"/>
         <pc:sldMkLst>
           <pc:docMk/>
           <pc:sldMk cId="1319564735" sldId="276"/>
         </pc:sldMkLst>
         <pc:spChg chg="mod">
-          <ac:chgData name="Andrew Kemp" userId="06d23b41cf651141" providerId="LiveId" clId="{64F8F7E6-B0A7-4A67-BE43-D2AC88E1A641}" dt="2024-12-02T16:13:22.969" v="471" actId="113"/>
+          <ac:chgData name="Andrew Kemp" userId="06d23b41cf651141" providerId="LiveId" clId="{64F8F7E6-B0A7-4A67-BE43-D2AC88E1A641}" dt="2024-12-03T17:11:25.537" v="921" actId="26606"/>
           <ac:spMkLst>
             <pc:docMk/>
             <pc:sldMk cId="1319564735" sldId="276"/>
@@ -1076,7 +1084,7 @@
           </ac:spMkLst>
         </pc:spChg>
         <pc:spChg chg="add del mod">
-          <ac:chgData name="Andrew Kemp" userId="06d23b41cf651141" providerId="LiveId" clId="{64F8F7E6-B0A7-4A67-BE43-D2AC88E1A641}" dt="2024-12-02T16:14:13.789" v="492" actId="20577"/>
+          <ac:chgData name="Andrew Kemp" userId="06d23b41cf651141" providerId="LiveId" clId="{64F8F7E6-B0A7-4A67-BE43-D2AC88E1A641}" dt="2024-12-03T17:11:25.537" v="921" actId="26606"/>
           <ac:spMkLst>
             <pc:docMk/>
             <pc:sldMk cId="1319564735" sldId="276"/>
@@ -1091,6 +1099,174 @@
             <ac:spMk id="4" creationId="{DC279707-302F-C506-41F7-1C444D6EDABE}"/>
           </ac:spMkLst>
         </pc:spChg>
+        <pc:spChg chg="add">
+          <ac:chgData name="Andrew Kemp" userId="06d23b41cf651141" providerId="LiveId" clId="{64F8F7E6-B0A7-4A67-BE43-D2AC88E1A641}" dt="2024-12-03T17:11:25.537" v="921" actId="26606"/>
+          <ac:spMkLst>
+            <pc:docMk/>
+            <pc:sldMk cId="1319564735" sldId="276"/>
+            <ac:spMk id="8" creationId="{E777E57D-6A88-4B5B-A068-2BA7FF4E8CCA}"/>
+          </ac:spMkLst>
+        </pc:spChg>
+        <pc:spChg chg="add del">
+          <ac:chgData name="Andrew Kemp" userId="06d23b41cf651141" providerId="LiveId" clId="{64F8F7E6-B0A7-4A67-BE43-D2AC88E1A641}" dt="2024-12-03T17:11:01.054" v="914" actId="26606"/>
+          <ac:spMkLst>
+            <pc:docMk/>
+            <pc:sldMk cId="1319564735" sldId="276"/>
+            <ac:spMk id="9" creationId="{8FC9BE17-9A7B-462D-AE50-3D8777387304}"/>
+          </ac:spMkLst>
+        </pc:spChg>
+        <pc:spChg chg="add del">
+          <ac:chgData name="Andrew Kemp" userId="06d23b41cf651141" providerId="LiveId" clId="{64F8F7E6-B0A7-4A67-BE43-D2AC88E1A641}" dt="2024-12-03T17:11:11.181" v="916" actId="26606"/>
+          <ac:spMkLst>
+            <pc:docMk/>
+            <pc:sldMk cId="1319564735" sldId="276"/>
+            <ac:spMk id="10" creationId="{90D01200-0224-43C5-AB38-FB4D16B73FB7}"/>
+          </ac:spMkLst>
+        </pc:spChg>
+        <pc:spChg chg="add del">
+          <ac:chgData name="Andrew Kemp" userId="06d23b41cf651141" providerId="LiveId" clId="{64F8F7E6-B0A7-4A67-BE43-D2AC88E1A641}" dt="2024-12-03T17:11:01.054" v="914" actId="26606"/>
+          <ac:spMkLst>
+            <pc:docMk/>
+            <pc:sldMk cId="1319564735" sldId="276"/>
+            <ac:spMk id="11" creationId="{3EBE8569-6AEC-4B8C-8D53-2DE337CDBA65}"/>
+          </ac:spMkLst>
+        </pc:spChg>
+        <pc:spChg chg="add del">
+          <ac:chgData name="Andrew Kemp" userId="06d23b41cf651141" providerId="LiveId" clId="{64F8F7E6-B0A7-4A67-BE43-D2AC88E1A641}" dt="2024-12-03T17:11:11.181" v="916" actId="26606"/>
+          <ac:spMkLst>
+            <pc:docMk/>
+            <pc:sldMk cId="1319564735" sldId="276"/>
+            <ac:spMk id="12" creationId="{728A44A4-A002-4A88-9FC9-1D0566C97A47}"/>
+          </ac:spMkLst>
+        </pc:spChg>
+        <pc:spChg chg="add del">
+          <ac:chgData name="Andrew Kemp" userId="06d23b41cf651141" providerId="LiveId" clId="{64F8F7E6-B0A7-4A67-BE43-D2AC88E1A641}" dt="2024-12-03T17:11:01.054" v="914" actId="26606"/>
+          <ac:spMkLst>
+            <pc:docMk/>
+            <pc:sldMk cId="1319564735" sldId="276"/>
+            <ac:spMk id="13" creationId="{55D4142C-5077-457F-A6AD-3FECFDB39685}"/>
+          </ac:spMkLst>
+        </pc:spChg>
+        <pc:spChg chg="add del">
+          <ac:chgData name="Andrew Kemp" userId="06d23b41cf651141" providerId="LiveId" clId="{64F8F7E6-B0A7-4A67-BE43-D2AC88E1A641}" dt="2024-12-03T17:11:11.181" v="916" actId="26606"/>
+          <ac:spMkLst>
+            <pc:docMk/>
+            <pc:sldMk cId="1319564735" sldId="276"/>
+            <ac:spMk id="14" creationId="{3E7D5C7B-DD16-401B-85CE-4AAA2A4F5136}"/>
+          </ac:spMkLst>
+        </pc:spChg>
+        <pc:spChg chg="add del">
+          <ac:chgData name="Andrew Kemp" userId="06d23b41cf651141" providerId="LiveId" clId="{64F8F7E6-B0A7-4A67-BE43-D2AC88E1A641}" dt="2024-12-03T17:11:01.054" v="914" actId="26606"/>
+          <ac:spMkLst>
+            <pc:docMk/>
+            <pc:sldMk cId="1319564735" sldId="276"/>
+            <ac:spMk id="15" creationId="{7A5F0580-5EE9-419F-96EE-B6529EF6E7D0}"/>
+          </ac:spMkLst>
+        </pc:spChg>
+        <pc:spChg chg="add del">
+          <ac:chgData name="Andrew Kemp" userId="06d23b41cf651141" providerId="LiveId" clId="{64F8F7E6-B0A7-4A67-BE43-D2AC88E1A641}" dt="2024-12-03T17:11:17.271" v="918" actId="26606"/>
+          <ac:spMkLst>
+            <pc:docMk/>
+            <pc:sldMk cId="1319564735" sldId="276"/>
+            <ac:spMk id="16" creationId="{8380AD67-C5CA-4918-B4BB-C359BB03EEDD}"/>
+          </ac:spMkLst>
+        </pc:spChg>
+        <pc:spChg chg="add del">
+          <ac:chgData name="Andrew Kemp" userId="06d23b41cf651141" providerId="LiveId" clId="{64F8F7E6-B0A7-4A67-BE43-D2AC88E1A641}" dt="2024-12-03T17:11:17.271" v="918" actId="26606"/>
+          <ac:spMkLst>
+            <pc:docMk/>
+            <pc:sldMk cId="1319564735" sldId="276"/>
+            <ac:spMk id="18" creationId="{EABAD4DA-87BA-4F70-9EF0-45C6BCF17823}"/>
+          </ac:spMkLst>
+        </pc:spChg>
+        <pc:spChg chg="add del">
+          <ac:chgData name="Andrew Kemp" userId="06d23b41cf651141" providerId="LiveId" clId="{64F8F7E6-B0A7-4A67-BE43-D2AC88E1A641}" dt="2024-12-03T17:11:17.271" v="918" actId="26606"/>
+          <ac:spMkLst>
+            <pc:docMk/>
+            <pc:sldMk cId="1319564735" sldId="276"/>
+            <ac:spMk id="19" creationId="{915128D9-2797-47FA-B6FE-EC24E6B8437A}"/>
+          </ac:spMkLst>
+        </pc:spChg>
+        <pc:spChg chg="add del">
+          <ac:chgData name="Andrew Kemp" userId="06d23b41cf651141" providerId="LiveId" clId="{64F8F7E6-B0A7-4A67-BE43-D2AC88E1A641}" dt="2024-12-03T17:11:25.532" v="920" actId="26606"/>
+          <ac:spMkLst>
+            <pc:docMk/>
+            <pc:sldMk cId="1319564735" sldId="276"/>
+            <ac:spMk id="21" creationId="{2C9A9DA9-7DC8-488B-A882-123947B0F3D9}"/>
+          </ac:spMkLst>
+        </pc:spChg>
+        <pc:spChg chg="add del">
+          <ac:chgData name="Andrew Kemp" userId="06d23b41cf651141" providerId="LiveId" clId="{64F8F7E6-B0A7-4A67-BE43-D2AC88E1A641}" dt="2024-12-03T17:11:25.532" v="920" actId="26606"/>
+          <ac:spMkLst>
+            <pc:docMk/>
+            <pc:sldMk cId="1319564735" sldId="276"/>
+            <ac:spMk id="22" creationId="{57F6BDD4-E066-4008-8011-6CC31AEB4556}"/>
+          </ac:spMkLst>
+        </pc:spChg>
+        <pc:spChg chg="add del">
+          <ac:chgData name="Andrew Kemp" userId="06d23b41cf651141" providerId="LiveId" clId="{64F8F7E6-B0A7-4A67-BE43-D2AC88E1A641}" dt="2024-12-03T17:11:25.532" v="920" actId="26606"/>
+          <ac:spMkLst>
+            <pc:docMk/>
+            <pc:sldMk cId="1319564735" sldId="276"/>
+            <ac:spMk id="23" creationId="{2711A8FB-68FC-45FC-B01E-38F809E2D439}"/>
+          </ac:spMkLst>
+        </pc:spChg>
+        <pc:spChg chg="add del">
+          <ac:chgData name="Andrew Kemp" userId="06d23b41cf651141" providerId="LiveId" clId="{64F8F7E6-B0A7-4A67-BE43-D2AC88E1A641}" dt="2024-12-03T17:11:25.532" v="920" actId="26606"/>
+          <ac:spMkLst>
+            <pc:docMk/>
+            <pc:sldMk cId="1319564735" sldId="276"/>
+            <ac:spMk id="24" creationId="{2A865FE3-5FC9-4049-87CF-30019C46C0F5}"/>
+          </ac:spMkLst>
+        </pc:spChg>
+        <pc:spChg chg="add">
+          <ac:chgData name="Andrew Kemp" userId="06d23b41cf651141" providerId="LiveId" clId="{64F8F7E6-B0A7-4A67-BE43-D2AC88E1A641}" dt="2024-12-03T17:11:25.537" v="921" actId="26606"/>
+          <ac:spMkLst>
+            <pc:docMk/>
+            <pc:sldMk cId="1319564735" sldId="276"/>
+            <ac:spMk id="27" creationId="{F7117410-A2A4-4085-9ADC-46744551DBDE}"/>
+          </ac:spMkLst>
+        </pc:spChg>
+        <pc:spChg chg="add">
+          <ac:chgData name="Andrew Kemp" userId="06d23b41cf651141" providerId="LiveId" clId="{64F8F7E6-B0A7-4A67-BE43-D2AC88E1A641}" dt="2024-12-03T17:11:25.537" v="921" actId="26606"/>
+          <ac:spMkLst>
+            <pc:docMk/>
+            <pc:sldMk cId="1319564735" sldId="276"/>
+            <ac:spMk id="28" creationId="{99F74EB5-E547-4FB4-95F5-BCC788F3C4A0}"/>
+          </ac:spMkLst>
+        </pc:spChg>
+        <pc:picChg chg="add del">
+          <ac:chgData name="Andrew Kemp" userId="06d23b41cf651141" providerId="LiveId" clId="{64F8F7E6-B0A7-4A67-BE43-D2AC88E1A641}" dt="2024-12-03T17:11:01.054" v="914" actId="26606"/>
+          <ac:picMkLst>
+            <pc:docMk/>
+            <pc:sldMk cId="1319564735" sldId="276"/>
+            <ac:picMk id="5" creationId="{E3B1F6DC-6A44-8FE1-707E-404780597B56}"/>
+          </ac:picMkLst>
+        </pc:picChg>
+        <pc:picChg chg="add del">
+          <ac:chgData name="Andrew Kemp" userId="06d23b41cf651141" providerId="LiveId" clId="{64F8F7E6-B0A7-4A67-BE43-D2AC88E1A641}" dt="2024-12-03T17:11:11.181" v="916" actId="26606"/>
+          <ac:picMkLst>
+            <pc:docMk/>
+            <pc:sldMk cId="1319564735" sldId="276"/>
+            <ac:picMk id="7" creationId="{136DCD8C-8974-250B-7F3F-BDAA3BC7D497}"/>
+          </ac:picMkLst>
+        </pc:picChg>
+        <pc:picChg chg="add del">
+          <ac:chgData name="Andrew Kemp" userId="06d23b41cf651141" providerId="LiveId" clId="{64F8F7E6-B0A7-4A67-BE43-D2AC88E1A641}" dt="2024-12-03T17:11:17.271" v="918" actId="26606"/>
+          <ac:picMkLst>
+            <pc:docMk/>
+            <pc:sldMk cId="1319564735" sldId="276"/>
+            <ac:picMk id="17" creationId="{74A887DF-F156-69FA-026D-95D4DCDA7452}"/>
+          </ac:picMkLst>
+        </pc:picChg>
+        <pc:picChg chg="add del">
+          <ac:chgData name="Andrew Kemp" userId="06d23b41cf651141" providerId="LiveId" clId="{64F8F7E6-B0A7-4A67-BE43-D2AC88E1A641}" dt="2024-12-03T17:11:25.532" v="920" actId="26606"/>
+          <ac:picMkLst>
+            <pc:docMk/>
+            <pc:sldMk cId="1319564735" sldId="276"/>
+            <ac:picMk id="25" creationId="{543C4753-16E7-0B7A-D39B-4871BD97EAAF}"/>
+          </ac:picMkLst>
+        </pc:picChg>
       </pc:sldChg>
     </pc:docChg>
   </pc:docChgLst>
@@ -1179,7 +1355,7 @@
           <a:p>
             <a:fld id="{8679E891-2C41-48EE-80B7-AB9A3E9AE90B}" type="datetimeFigureOut">
               <a:rPr lang="en-US" smtClean="0"/>
-              <a:t>12/2/2024</a:t>
+              <a:t>12/3/2024</a:t>
             </a:fld>
             <a:endParaRPr lang="en-US"/>
           </a:p>
@@ -1782,6 +1958,90 @@
 </p:notes>
 </file>
 
+<file path=ppt/notesSlides/notesSlide5.xml><?xml version="1.0" encoding="utf-8"?>
+<p:notes xmlns:a="http://schemas.openxmlformats.org/drawingml/2006/main" xmlns:r="http://schemas.openxmlformats.org/officeDocument/2006/relationships" xmlns:p="http://schemas.openxmlformats.org/presentationml/2006/main">
+  <p:cSld>
+    <p:spTree>
+      <p:nvGrpSpPr>
+        <p:cNvPr id="1" name=""/>
+        <p:cNvGrpSpPr/>
+        <p:nvPr/>
+      </p:nvGrpSpPr>
+      <p:grpSpPr>
+        <a:xfrm>
+          <a:off x="0" y="0"/>
+          <a:ext cx="0" cy="0"/>
+          <a:chOff x="0" y="0"/>
+          <a:chExt cx="0" cy="0"/>
+        </a:xfrm>
+      </p:grpSpPr>
+      <p:sp>
+        <p:nvSpPr>
+          <p:cNvPr id="2" name="Slide Image Placeholder 1"/>
+          <p:cNvSpPr>
+            <a:spLocks noGrp="1" noRot="1" noChangeAspect="1"/>
+          </p:cNvSpPr>
+          <p:nvPr>
+            <p:ph type="sldImg"/>
+          </p:nvPr>
+        </p:nvSpPr>
+        <p:spPr/>
+      </p:sp>
+      <p:sp>
+        <p:nvSpPr>
+          <p:cNvPr id="3" name="Notes Placeholder 2"/>
+          <p:cNvSpPr>
+            <a:spLocks noGrp="1"/>
+          </p:cNvSpPr>
+          <p:nvPr>
+            <p:ph type="body" idx="1"/>
+          </p:nvPr>
+        </p:nvSpPr>
+        <p:spPr/>
+        <p:txBody>
+          <a:bodyPr/>
+          <a:lstStyle/>
+          <a:p>
+            <a:endParaRPr lang="en-US" dirty="0"/>
+          </a:p>
+        </p:txBody>
+      </p:sp>
+      <p:sp>
+        <p:nvSpPr>
+          <p:cNvPr id="4" name="Slide Number Placeholder 3"/>
+          <p:cNvSpPr>
+            <a:spLocks noGrp="1"/>
+          </p:cNvSpPr>
+          <p:nvPr>
+            <p:ph type="sldNum" sz="quarter" idx="5"/>
+          </p:nvPr>
+        </p:nvSpPr>
+        <p:spPr/>
+        <p:txBody>
+          <a:bodyPr/>
+          <a:lstStyle/>
+          <a:p>
+            <a:fld id="{3AB11C39-B6E5-45EC-BACA-3432A9334DA1}" type="slidenum">
+              <a:rPr lang="en-US" smtClean="0"/>
+              <a:t>17</a:t>
+            </a:fld>
+            <a:endParaRPr lang="en-US"/>
+          </a:p>
+        </p:txBody>
+      </p:sp>
+    </p:spTree>
+    <p:extLst>
+      <p:ext uri="{BB962C8B-B14F-4D97-AF65-F5344CB8AC3E}">
+        <p14:creationId xmlns:p14="http://schemas.microsoft.com/office/powerpoint/2010/main" val="2584293208"/>
+      </p:ext>
+    </p:extLst>
+  </p:cSld>
+  <p:clrMapOvr>
+    <a:masterClrMapping/>
+  </p:clrMapOvr>
+</p:notes>
+</file>
+
 <file path=ppt/slideLayouts/slideLayout1.xml><?xml version="1.0" encoding="utf-8"?>
 <p:sldLayout xmlns:a="http://schemas.openxmlformats.org/drawingml/2006/main" xmlns:r="http://schemas.openxmlformats.org/officeDocument/2006/relationships" xmlns:p="http://schemas.openxmlformats.org/presentationml/2006/main" type="title" preserve="1">
   <p:cSld name="Title Slide">
@@ -1938,7 +2198,7 @@
           <a:p>
             <a:fld id="{02AC24A9-CCB6-4F8D-B8DB-C2F3692CFA5A}" type="datetimeFigureOut">
               <a:rPr lang="en-US" smtClean="0"/>
-              <a:t>12/2/2024</a:t>
+              <a:t>12/3/2024</a:t>
             </a:fld>
             <a:endParaRPr lang="en-US" dirty="0"/>
           </a:p>
@@ -2308,7 +2568,7 @@
           <a:p>
             <a:fld id="{02AC24A9-CCB6-4F8D-B8DB-C2F3692CFA5A}" type="datetimeFigureOut">
               <a:rPr lang="en-US" smtClean="0"/>
-              <a:t>12/2/2024</a:t>
+              <a:t>12/3/2024</a:t>
             </a:fld>
             <a:endParaRPr lang="en-US"/>
           </a:p>
@@ -2517,7 +2777,7 @@
           <a:p>
             <a:fld id="{02AC24A9-CCB6-4F8D-B8DB-C2F3692CFA5A}" type="datetimeFigureOut">
               <a:rPr lang="en-US" smtClean="0"/>
-              <a:t>12/2/2024</a:t>
+              <a:t>12/3/2024</a:t>
             </a:fld>
             <a:endParaRPr lang="en-US"/>
           </a:p>
@@ -2987,7 +3247,7 @@
           <a:p>
             <a:fld id="{02AC24A9-CCB6-4F8D-B8DB-C2F3692CFA5A}" type="datetimeFigureOut">
               <a:rPr lang="en-US" smtClean="0"/>
-              <a:t>12/2/2024</a:t>
+              <a:t>12/3/2024</a:t>
             </a:fld>
             <a:endParaRPr lang="en-US"/>
           </a:p>
@@ -3441,7 +3701,7 @@
           <a:p>
             <a:fld id="{02AC24A9-CCB6-4F8D-B8DB-C2F3692CFA5A}" type="datetimeFigureOut">
               <a:rPr lang="en-US" smtClean="0"/>
-              <a:t>12/2/2024</a:t>
+              <a:t>12/3/2024</a:t>
             </a:fld>
             <a:endParaRPr lang="en-US"/>
           </a:p>
@@ -3973,7 +4233,7 @@
           <a:p>
             <a:fld id="{02AC24A9-CCB6-4F8D-B8DB-C2F3692CFA5A}" type="datetimeFigureOut">
               <a:rPr lang="en-US" smtClean="0"/>
-              <a:t>12/2/2024</a:t>
+              <a:t>12/3/2024</a:t>
             </a:fld>
             <a:endParaRPr lang="en-US"/>
           </a:p>
@@ -4672,7 +4932,7 @@
           <a:p>
             <a:fld id="{02AC24A9-CCB6-4F8D-B8DB-C2F3692CFA5A}" type="datetimeFigureOut">
               <a:rPr lang="en-US" smtClean="0"/>
-              <a:t>12/2/2024</a:t>
+              <a:t>12/3/2024</a:t>
             </a:fld>
             <a:endParaRPr lang="en-US"/>
           </a:p>
@@ -5001,7 +5261,7 @@
           <a:p>
             <a:fld id="{02AC24A9-CCB6-4F8D-B8DB-C2F3692CFA5A}" type="datetimeFigureOut">
               <a:rPr lang="en-US" smtClean="0"/>
-              <a:t>12/2/2024</a:t>
+              <a:t>12/3/2024</a:t>
             </a:fld>
             <a:endParaRPr lang="en-US"/>
           </a:p>
@@ -5114,7 +5374,7 @@
           <a:p>
             <a:fld id="{02AC24A9-CCB6-4F8D-B8DB-C2F3692CFA5A}" type="datetimeFigureOut">
               <a:rPr lang="en-US" smtClean="0"/>
-              <a:t>12/2/2024</a:t>
+              <a:t>12/3/2024</a:t>
             </a:fld>
             <a:endParaRPr lang="en-US"/>
           </a:p>
@@ -5609,7 +5869,7 @@
           <a:p>
             <a:fld id="{02AC24A9-CCB6-4F8D-B8DB-C2F3692CFA5A}" type="datetimeFigureOut">
               <a:rPr lang="en-US" smtClean="0"/>
-              <a:t>12/2/2024</a:t>
+              <a:t>12/3/2024</a:t>
             </a:fld>
             <a:endParaRPr lang="en-US" dirty="0"/>
           </a:p>
@@ -6086,7 +6346,7 @@
           <a:p>
             <a:fld id="{02AC24A9-CCB6-4F8D-B8DB-C2F3692CFA5A}" type="datetimeFigureOut">
               <a:rPr lang="en-US" smtClean="0"/>
-              <a:t>12/2/2024</a:t>
+              <a:t>12/3/2024</a:t>
             </a:fld>
             <a:endParaRPr lang="en-US"/>
           </a:p>
@@ -6329,7 +6589,7 @@
           <a:p>
             <a:fld id="{02AC24A9-CCB6-4F8D-B8DB-C2F3692CFA5A}" type="datetimeFigureOut">
               <a:rPr lang="en-US" smtClean="0"/>
-              <a:t>12/2/2024</a:t>
+              <a:t>12/3/2024</a:t>
             </a:fld>
             <a:endParaRPr lang="en-US"/>
           </a:p>
@@ -7185,7 +7445,7 @@
         </p:spPr>
         <p:txBody>
           <a:bodyPr>
-            <a:normAutofit/>
+            <a:normAutofit lnSpcReduction="10000"/>
           </a:bodyPr>
           <a:lstStyle/>
           <a:p>
@@ -7195,7 +7455,7 @@
             </a:r>
             <a:r>
               <a:rPr lang="en-US" sz="2000" dirty="0"/>
-              <a:t>: Median income rose from $119,540 (2010) to $174,148 (2023).</a:t>
+              <a:t>: Median household income rose from $119,540 (2010) to $174,148 (2023).</a:t>
             </a:r>
           </a:p>
           <a:p>
@@ -8654,7 +8914,7 @@
           <a:p>
             <a:r>
               <a:rPr lang="en-US" b="1" dirty="0"/>
-              <a:t>Loudoun County Income Trends and Predictions</a:t>
+              <a:t>Loudoun County Household Income Trends and Predictions</a:t>
             </a:r>
           </a:p>
         </p:txBody>
@@ -8689,7 +8949,7 @@
           <a:p>
             <a:r>
               <a:rPr lang="en-US" sz="2000" b="1" dirty="0"/>
-              <a:t>Median income in Loudoun County </a:t>
+              <a:t>Median household income in Loudoun County </a:t>
             </a:r>
             <a:r>
               <a:rPr lang="en-US" sz="2000" dirty="0"/>
@@ -8709,7 +8969,7 @@
           <a:p>
             <a:r>
               <a:rPr lang="en-US" sz="2000" b="1" dirty="0"/>
-              <a:t>Predicted median income may exceed $350,000 by 2030</a:t>
+              <a:t>Predicted median household income expected to exceed $300,000 by 2030</a:t>
             </a:r>
             <a:r>
               <a:rPr lang="en-US" sz="2000" dirty="0"/>
@@ -8720,10 +8980,10 @@
       </p:sp>
       <p:pic>
         <p:nvPicPr>
-          <p:cNvPr id="6" name="Picture 5" descr="A graph with a line and a dotted line&#10;&#10;Description automatically generated">
-            <a:extLst>
-              <a:ext uri="{FF2B5EF4-FFF2-40B4-BE49-F238E27FC236}">
-                <a16:creationId xmlns:a16="http://schemas.microsoft.com/office/drawing/2014/main" id="{878A7999-5F7F-264D-242F-90054D6AB14F}"/>
+          <p:cNvPr id="5" name="Picture 4">
+            <a:extLst>
+              <a:ext uri="{FF2B5EF4-FFF2-40B4-BE49-F238E27FC236}">
+                <a16:creationId xmlns:a16="http://schemas.microsoft.com/office/drawing/2014/main" id="{41D28ECC-03FF-7BBA-7567-1F114A032208}"/>
               </a:ext>
             </a:extLst>
           </p:cNvPr>
@@ -8733,21 +8993,15 @@
           <p:nvPr/>
         </p:nvPicPr>
         <p:blipFill>
-          <a:blip r:embed="rId2">
-            <a:extLst>
-              <a:ext uri="{28A0092B-C50C-407E-A947-70E740481C1C}">
-                <a14:useLocalDpi xmlns:a14="http://schemas.microsoft.com/office/drawing/2010/main" val="0"/>
-              </a:ext>
-            </a:extLst>
-          </a:blip>
+          <a:blip r:embed="rId3"/>
           <a:stretch>
             <a:fillRect/>
           </a:stretch>
         </p:blipFill>
         <p:spPr>
           <a:xfrm>
-            <a:off x="518454" y="2081867"/>
-            <a:ext cx="7539696" cy="4580118"/>
+            <a:off x="342242" y="2090117"/>
+            <a:ext cx="7715908" cy="4676308"/>
           </a:xfrm>
           <a:prstGeom prst="rect">
             <a:avLst/>
@@ -9278,6 +9532,14 @@
 <file path=ppt/slides/slide21.xml><?xml version="1.0" encoding="utf-8"?>
 <p:sld xmlns:a="http://schemas.openxmlformats.org/drawingml/2006/main" xmlns:r="http://schemas.openxmlformats.org/officeDocument/2006/relationships" xmlns:p="http://schemas.openxmlformats.org/presentationml/2006/main">
   <p:cSld>
+    <p:bg>
+      <p:bgPr>
+        <a:solidFill>
+          <a:schemeClr val="bg1"/>
+        </a:solidFill>
+        <a:effectLst/>
+      </p:bgPr>
+    </p:bg>
     <p:spTree>
       <p:nvGrpSpPr>
         <p:cNvPr id="1" name=""/>
@@ -9292,54 +9554,309 @@
           <a:chExt cx="0" cy="0"/>
         </a:xfrm>
       </p:grpSpPr>
-      <p:sp>
-        <p:nvSpPr>
-          <p:cNvPr id="2" name="Title 1">
-            <a:extLst>
-              <a:ext uri="{FF2B5EF4-FFF2-40B4-BE49-F238E27FC236}">
-                <a16:creationId xmlns:a16="http://schemas.microsoft.com/office/drawing/2014/main" id="{68343746-3B28-7232-5B6E-D880C8F860C7}"/>
-              </a:ext>
-            </a:extLst>
-          </p:cNvPr>
-          <p:cNvSpPr>
-            <a:spLocks noGrp="1"/>
-          </p:cNvSpPr>
-          <p:nvPr>
-            <p:ph type="title"/>
-          </p:nvPr>
-        </p:nvSpPr>
-        <p:spPr/>
-        <p:txBody>
-          <a:bodyPr/>
-          <a:lstStyle/>
-          <a:p>
-            <a:r>
-              <a:rPr lang="en-US" b="1" dirty="0"/>
-              <a:t>Questions</a:t>
-            </a:r>
-          </a:p>
-        </p:txBody>
-      </p:sp>
-      <p:sp>
-        <p:nvSpPr>
-          <p:cNvPr id="3" name="Content Placeholder 2">
-            <a:extLst>
-              <a:ext uri="{FF2B5EF4-FFF2-40B4-BE49-F238E27FC236}">
-                <a16:creationId xmlns:a16="http://schemas.microsoft.com/office/drawing/2014/main" id="{1E7EA290-481B-5C71-947A-D1DF6008CECA}"/>
-              </a:ext>
-            </a:extLst>
-          </p:cNvPr>
-          <p:cNvSpPr>
-            <a:spLocks noGrp="1"/>
-          </p:cNvSpPr>
-          <p:nvPr>
-            <p:ph idx="1"/>
+      <p:sp useBgFill="1">
+        <p:nvSpPr>
+          <p:cNvPr id="8" name="Rectangle 7">
+            <a:extLst>
+              <a:ext uri="{FF2B5EF4-FFF2-40B4-BE49-F238E27FC236}">
+                <a16:creationId xmlns:a16="http://schemas.microsoft.com/office/drawing/2014/main" id="{E777E57D-6A88-4B5B-A068-2BA7FF4E8CCA}"/>
+              </a:ext>
+              <a:ext uri="{C183D7F6-B498-43B3-948B-1728B52AA6E4}">
+                <adec:decorative xmlns:adec="http://schemas.microsoft.com/office/drawing/2017/decorative" val="1"/>
+              </a:ext>
+            </a:extLst>
+          </p:cNvPr>
+          <p:cNvSpPr>
+            <a:spLocks noGrp="1" noRot="1" noChangeAspect="1" noMove="1" noResize="1" noEditPoints="1" noAdjustHandles="1" noChangeArrowheads="1" noChangeShapeType="1" noTextEdit="1"/>
+          </p:cNvSpPr>
+          <p:nvPr>
+            <p:extLst>
+              <p:ext uri="{386F3935-93C4-4BCD-93E2-E3B085C9AB24}">
+                <p16:designElem xmlns:p16="http://schemas.microsoft.com/office/powerpoint/2015/main" val="1"/>
+              </p:ext>
+            </p:extLst>
           </p:nvPr>
         </p:nvSpPr>
         <p:spPr>
           <a:xfrm>
-            <a:off x="859536" y="2478024"/>
-            <a:ext cx="10424160" cy="3694176"/>
+            <a:off x="0" y="0"/>
+            <a:ext cx="12192000" cy="6858000"/>
+          </a:xfrm>
+          <a:prstGeom prst="rect">
+            <a:avLst/>
+          </a:prstGeom>
+          <a:ln>
+            <a:noFill/>
+          </a:ln>
+        </p:spPr>
+        <p:style>
+          <a:lnRef idx="2">
+            <a:schemeClr val="accent1">
+              <a:shade val="50000"/>
+            </a:schemeClr>
+          </a:lnRef>
+          <a:fillRef idx="1">
+            <a:schemeClr val="accent1"/>
+          </a:fillRef>
+          <a:effectRef idx="0">
+            <a:schemeClr val="accent1"/>
+          </a:effectRef>
+          <a:fontRef idx="minor">
+            <a:schemeClr val="lt1"/>
+          </a:fontRef>
+        </p:style>
+        <p:txBody>
+          <a:bodyPr rtlCol="0" anchor="ctr"/>
+          <a:lstStyle/>
+          <a:p>
+            <a:pPr algn="ctr"/>
+            <a:endParaRPr lang="en-US"/>
+          </a:p>
+        </p:txBody>
+      </p:sp>
+      <p:sp>
+        <p:nvSpPr>
+          <p:cNvPr id="2" name="Title 1">
+            <a:extLst>
+              <a:ext uri="{FF2B5EF4-FFF2-40B4-BE49-F238E27FC236}">
+                <a16:creationId xmlns:a16="http://schemas.microsoft.com/office/drawing/2014/main" id="{68343746-3B28-7232-5B6E-D880C8F860C7}"/>
+              </a:ext>
+            </a:extLst>
+          </p:cNvPr>
+          <p:cNvSpPr>
+            <a:spLocks noGrp="1"/>
+          </p:cNvSpPr>
+          <p:nvPr>
+            <p:ph type="title"/>
+          </p:nvPr>
+        </p:nvSpPr>
+        <p:spPr>
+          <a:xfrm>
+            <a:off x="841248" y="503132"/>
+            <a:ext cx="10509504" cy="1974892"/>
+          </a:xfrm>
+        </p:spPr>
+        <p:txBody>
+          <a:bodyPr anchor="b">
+            <a:normAutofit/>
+          </a:bodyPr>
+          <a:lstStyle/>
+          <a:p>
+            <a:r>
+              <a:rPr lang="en-US" sz="5400" b="1"/>
+              <a:t>Questions</a:t>
+            </a:r>
+          </a:p>
+        </p:txBody>
+      </p:sp>
+      <p:sp>
+        <p:nvSpPr>
+          <p:cNvPr id="27" name="Rectangle 26">
+            <a:extLst>
+              <a:ext uri="{FF2B5EF4-FFF2-40B4-BE49-F238E27FC236}">
+                <a16:creationId xmlns:a16="http://schemas.microsoft.com/office/drawing/2014/main" id="{F7117410-A2A4-4085-9ADC-46744551DBDE}"/>
+              </a:ext>
+              <a:ext uri="{C183D7F6-B498-43B3-948B-1728B52AA6E4}">
+                <adec:decorative xmlns:adec="http://schemas.microsoft.com/office/drawing/2017/decorative" val="1"/>
+              </a:ext>
+            </a:extLst>
+          </p:cNvPr>
+          <p:cNvSpPr>
+            <a:spLocks noGrp="1" noRot="1" noChangeAspect="1" noMove="1" noResize="1" noEditPoints="1" noAdjustHandles="1" noChangeArrowheads="1" noChangeShapeType="1" noTextEdit="1"/>
+          </p:cNvSpPr>
+          <p:nvPr>
+            <p:extLst>
+              <p:ext uri="{386F3935-93C4-4BCD-93E2-E3B085C9AB24}">
+                <p16:designElem xmlns:p16="http://schemas.microsoft.com/office/powerpoint/2015/main" val="1"/>
+              </p:ext>
+            </p:extLst>
+          </p:nvPr>
+        </p:nvSpPr>
+        <p:spPr>
+          <a:xfrm>
+            <a:off x="842772" y="0"/>
+            <a:ext cx="10506456" cy="191386"/>
+          </a:xfrm>
+          <a:prstGeom prst="rect">
+            <a:avLst/>
+          </a:prstGeom>
+          <a:solidFill>
+            <a:schemeClr val="accent1"/>
+          </a:solidFill>
+          <a:ln>
+            <a:noFill/>
+          </a:ln>
+        </p:spPr>
+        <p:style>
+          <a:lnRef idx="2">
+            <a:schemeClr val="accent1">
+              <a:shade val="50000"/>
+            </a:schemeClr>
+          </a:lnRef>
+          <a:fillRef idx="1">
+            <a:schemeClr val="accent1"/>
+          </a:fillRef>
+          <a:effectRef idx="0">
+            <a:schemeClr val="accent1"/>
+          </a:effectRef>
+          <a:fontRef idx="minor">
+            <a:schemeClr val="lt1"/>
+          </a:fontRef>
+        </p:style>
+        <p:txBody>
+          <a:bodyPr rtlCol="0" anchor="ctr"/>
+          <a:lstStyle/>
+          <a:p>
+            <a:pPr marL="0" marR="0" lvl="0" indent="0" algn="ctr" defTabSz="914400" rtl="0" eaLnBrk="1" fontAlgn="auto" latinLnBrk="0" hangingPunct="1">
+              <a:lnSpc>
+                <a:spcPct val="100000"/>
+              </a:lnSpc>
+              <a:spcBef>
+                <a:spcPts val="0"/>
+              </a:spcBef>
+              <a:spcAft>
+                <a:spcPts val="0"/>
+              </a:spcAft>
+              <a:buClrTx/>
+              <a:buSzTx/>
+              <a:buFontTx/>
+              <a:buNone/>
+              <a:tabLst/>
+              <a:defRPr/>
+            </a:pPr>
+            <a:endParaRPr kumimoji="0" lang="en-US" sz="1800" b="0" i="0" u="none" strike="noStrike" kern="1200" cap="none" spc="0" normalizeH="0" baseline="0" noProof="0">
+              <a:ln>
+                <a:noFill/>
+              </a:ln>
+              <a:solidFill>
+                <a:prstClr val="white"/>
+              </a:solidFill>
+              <a:effectLst/>
+              <a:uLnTx/>
+              <a:uFillTx/>
+              <a:latin typeface="Calibri" panose="020F0502020204030204"/>
+              <a:ea typeface="+mn-ea"/>
+              <a:cs typeface="+mn-cs"/>
+            </a:endParaRPr>
+          </a:p>
+        </p:txBody>
+      </p:sp>
+      <p:sp>
+        <p:nvSpPr>
+          <p:cNvPr id="28" name="Rectangle 27">
+            <a:extLst>
+              <a:ext uri="{FF2B5EF4-FFF2-40B4-BE49-F238E27FC236}">
+                <a16:creationId xmlns:a16="http://schemas.microsoft.com/office/drawing/2014/main" id="{99F74EB5-E547-4FB4-95F5-BCC788F3C4A0}"/>
+              </a:ext>
+              <a:ext uri="{C183D7F6-B498-43B3-948B-1728B52AA6E4}">
+                <adec:decorative xmlns:adec="http://schemas.microsoft.com/office/drawing/2017/decorative" val="1"/>
+              </a:ext>
+            </a:extLst>
+          </p:cNvPr>
+          <p:cNvSpPr>
+            <a:spLocks noGrp="1" noRot="1" noChangeAspect="1" noMove="1" noResize="1" noEditPoints="1" noAdjustHandles="1" noChangeArrowheads="1" noChangeShapeType="1" noTextEdit="1"/>
+          </p:cNvSpPr>
+          <p:nvPr>
+            <p:extLst>
+              <p:ext uri="{386F3935-93C4-4BCD-93E2-E3B085C9AB24}">
+                <p16:designElem xmlns:p16="http://schemas.microsoft.com/office/powerpoint/2015/main" val="1"/>
+              </p:ext>
+            </p:extLst>
+          </p:nvPr>
+        </p:nvSpPr>
+        <p:spPr>
+          <a:xfrm>
+            <a:off x="841248" y="2894076"/>
+            <a:ext cx="10506456" cy="18288"/>
+          </a:xfrm>
+          <a:prstGeom prst="rect">
+            <a:avLst/>
+          </a:prstGeom>
+          <a:solidFill>
+            <a:schemeClr val="tx2">
+              <a:lumMod val="25000"/>
+              <a:lumOff val="75000"/>
+            </a:schemeClr>
+          </a:solidFill>
+          <a:ln w="3175">
+            <a:noFill/>
+          </a:ln>
+          <a:effectLst/>
+        </p:spPr>
+        <p:style>
+          <a:lnRef idx="2">
+            <a:schemeClr val="accent1">
+              <a:shade val="50000"/>
+            </a:schemeClr>
+          </a:lnRef>
+          <a:fillRef idx="1">
+            <a:schemeClr val="accent1"/>
+          </a:fillRef>
+          <a:effectRef idx="0">
+            <a:schemeClr val="accent1"/>
+          </a:effectRef>
+          <a:fontRef idx="minor">
+            <a:schemeClr val="lt1"/>
+          </a:fontRef>
+        </p:style>
+        <p:txBody>
+          <a:bodyPr rtlCol="0" anchor="ctr"/>
+          <a:lstStyle/>
+          <a:p>
+            <a:pPr marL="0" marR="0" lvl="0" indent="0" algn="ctr" defTabSz="914400" rtl="0" eaLnBrk="1" fontAlgn="auto" latinLnBrk="0" hangingPunct="1">
+              <a:lnSpc>
+                <a:spcPct val="100000"/>
+              </a:lnSpc>
+              <a:spcBef>
+                <a:spcPts val="0"/>
+              </a:spcBef>
+              <a:spcAft>
+                <a:spcPts val="0"/>
+              </a:spcAft>
+              <a:buClrTx/>
+              <a:buSzTx/>
+              <a:buFontTx/>
+              <a:buNone/>
+              <a:tabLst/>
+              <a:defRPr/>
+            </a:pPr>
+            <a:endParaRPr kumimoji="0" lang="en-US" sz="1800" b="0" i="0" u="none" strike="noStrike" kern="1200" cap="none" spc="0" normalizeH="0" baseline="0" noProof="0">
+              <a:ln>
+                <a:noFill/>
+              </a:ln>
+              <a:solidFill>
+                <a:prstClr val="white"/>
+              </a:solidFill>
+              <a:effectLst/>
+              <a:uLnTx/>
+              <a:uFillTx/>
+              <a:latin typeface="Calibri" panose="020F0502020204030204"/>
+              <a:ea typeface="+mn-ea"/>
+              <a:cs typeface="+mn-cs"/>
+            </a:endParaRPr>
+          </a:p>
+        </p:txBody>
+      </p:sp>
+      <p:sp>
+        <p:nvSpPr>
+          <p:cNvPr id="3" name="Content Placeholder 2">
+            <a:extLst>
+              <a:ext uri="{FF2B5EF4-FFF2-40B4-BE49-F238E27FC236}">
+                <a16:creationId xmlns:a16="http://schemas.microsoft.com/office/drawing/2014/main" id="{1E7EA290-481B-5C71-947A-D1DF6008CECA}"/>
+              </a:ext>
+            </a:extLst>
+          </p:cNvPr>
+          <p:cNvSpPr>
+            <a:spLocks noGrp="1"/>
+          </p:cNvSpPr>
+          <p:nvPr>
+            <p:ph idx="1"/>
+          </p:nvPr>
+        </p:nvSpPr>
+        <p:spPr>
+          <a:xfrm>
+            <a:off x="841248" y="3328416"/>
+            <a:ext cx="10509504" cy="2715768"/>
           </a:xfrm>
         </p:spPr>
         <p:txBody>
@@ -9349,21 +9866,21 @@
           <a:lstStyle/>
           <a:p>
             <a:r>
-              <a:rPr lang="en-US" dirty="0"/>
+              <a:rPr lang="en-US" sz="2000"/>
               <a:t>Any questions?</a:t>
             </a:r>
           </a:p>
           <a:p>
             <a:pPr lvl="1"/>
             <a:r>
-              <a:rPr lang="en-US" dirty="0"/>
+              <a:rPr lang="en-US" sz="2000"/>
               <a:t>Feel free to ask for clarifications or further insights on the analysis.</a:t>
             </a:r>
           </a:p>
           <a:p>
             <a:pPr lvl="1"/>
             <a:r>
-              <a:rPr lang="en-US" dirty="0"/>
+              <a:rPr lang="en-US" sz="2000"/>
               <a:t>Thank you for your attention! I appreciate your time and interest in this study.</a:t>
             </a:r>
           </a:p>

</xml_diff>